<commit_message>
improve image sourcing (#9)
</commit_message>
<xml_diff>
--- a/.offline/logo.pptx
+++ b/.offline/logo.pptx
@@ -1,6 +1,6 @@
 
 <file path=ppt/presentation.xml><?xml version="1.0" encoding="utf-8"?>
-<p:presentation xmlns:a="http://schemas.openxmlformats.org/drawingml/2006/main" xmlns:r="http://schemas.openxmlformats.org/officeDocument/2006/relationships" xmlns:p="http://schemas.openxmlformats.org/presentationml/2006/main" saveSubsetFonts="1">
+<p:presentation xmlns:a="http://schemas.openxmlformats.org/drawingml/2006/main" xmlns:r="http://schemas.openxmlformats.org/officeDocument/2006/relationships" xmlns:p="http://schemas.openxmlformats.org/presentationml/2006/main" removePersonalInfoOnSave="1" saveSubsetFonts="1">
   <p:sldMasterIdLst>
     <p:sldMasterId id="2147483648" r:id="rId1"/>
   </p:sldMasterIdLst>
@@ -104,6 +104,11 @@
       </a:defRPr>
     </a:lvl9pPr>
   </p:defaultTextStyle>
+  <p:extLst>
+    <p:ext uri="{EFAFB233-063F-42B5-8137-9DF3F51BA10A}">
+      <p15:sldGuideLst xmlns:p15="http://schemas.microsoft.com/office/powerpoint/2012/main"/>
+    </p:ext>
+  </p:extLst>
 </p:presentation>
 </file>
 
@@ -254,7 +259,7 @@
           <a:p>
             <a:fld id="{5CC0DD09-D29D-4A04-80A3-8DFC411E4748}" type="datetimeFigureOut">
               <a:rPr lang="en-US" smtClean="0"/>
-              <a:t>5/5/2023</a:t>
+              <a:t>5/23/2023</a:t>
             </a:fld>
             <a:endParaRPr lang="en-US"/>
           </a:p>
@@ -452,7 +457,7 @@
           <a:p>
             <a:fld id="{5CC0DD09-D29D-4A04-80A3-8DFC411E4748}" type="datetimeFigureOut">
               <a:rPr lang="en-US" smtClean="0"/>
-              <a:t>5/5/2023</a:t>
+              <a:t>5/23/2023</a:t>
             </a:fld>
             <a:endParaRPr lang="en-US"/>
           </a:p>
@@ -660,7 +665,7 @@
           <a:p>
             <a:fld id="{5CC0DD09-D29D-4A04-80A3-8DFC411E4748}" type="datetimeFigureOut">
               <a:rPr lang="en-US" smtClean="0"/>
-              <a:t>5/5/2023</a:t>
+              <a:t>5/23/2023</a:t>
             </a:fld>
             <a:endParaRPr lang="en-US"/>
           </a:p>
@@ -858,7 +863,7 @@
           <a:p>
             <a:fld id="{5CC0DD09-D29D-4A04-80A3-8DFC411E4748}" type="datetimeFigureOut">
               <a:rPr lang="en-US" smtClean="0"/>
-              <a:t>5/5/2023</a:t>
+              <a:t>5/23/2023</a:t>
             </a:fld>
             <a:endParaRPr lang="en-US"/>
           </a:p>
@@ -1133,7 +1138,7 @@
           <a:p>
             <a:fld id="{5CC0DD09-D29D-4A04-80A3-8DFC411E4748}" type="datetimeFigureOut">
               <a:rPr lang="en-US" smtClean="0"/>
-              <a:t>5/5/2023</a:t>
+              <a:t>5/23/2023</a:t>
             </a:fld>
             <a:endParaRPr lang="en-US"/>
           </a:p>
@@ -1398,7 +1403,7 @@
           <a:p>
             <a:fld id="{5CC0DD09-D29D-4A04-80A3-8DFC411E4748}" type="datetimeFigureOut">
               <a:rPr lang="en-US" smtClean="0"/>
-              <a:t>5/5/2023</a:t>
+              <a:t>5/23/2023</a:t>
             </a:fld>
             <a:endParaRPr lang="en-US"/>
           </a:p>
@@ -1810,7 +1815,7 @@
           <a:p>
             <a:fld id="{5CC0DD09-D29D-4A04-80A3-8DFC411E4748}" type="datetimeFigureOut">
               <a:rPr lang="en-US" smtClean="0"/>
-              <a:t>5/5/2023</a:t>
+              <a:t>5/23/2023</a:t>
             </a:fld>
             <a:endParaRPr lang="en-US"/>
           </a:p>
@@ -1951,7 +1956,7 @@
           <a:p>
             <a:fld id="{5CC0DD09-D29D-4A04-80A3-8DFC411E4748}" type="datetimeFigureOut">
               <a:rPr lang="en-US" smtClean="0"/>
-              <a:t>5/5/2023</a:t>
+              <a:t>5/23/2023</a:t>
             </a:fld>
             <a:endParaRPr lang="en-US"/>
           </a:p>
@@ -2064,7 +2069,7 @@
           <a:p>
             <a:fld id="{5CC0DD09-D29D-4A04-80A3-8DFC411E4748}" type="datetimeFigureOut">
               <a:rPr lang="en-US" smtClean="0"/>
-              <a:t>5/5/2023</a:t>
+              <a:t>5/23/2023</a:t>
             </a:fld>
             <a:endParaRPr lang="en-US"/>
           </a:p>
@@ -2375,7 +2380,7 @@
           <a:p>
             <a:fld id="{5CC0DD09-D29D-4A04-80A3-8DFC411E4748}" type="datetimeFigureOut">
               <a:rPr lang="en-US" smtClean="0"/>
-              <a:t>5/5/2023</a:t>
+              <a:t>5/23/2023</a:t>
             </a:fld>
             <a:endParaRPr lang="en-US"/>
           </a:p>
@@ -2663,7 +2668,7 @@
           <a:p>
             <a:fld id="{5CC0DD09-D29D-4A04-80A3-8DFC411E4748}" type="datetimeFigureOut">
               <a:rPr lang="en-US" smtClean="0"/>
-              <a:t>5/5/2023</a:t>
+              <a:t>5/23/2023</a:t>
             </a:fld>
             <a:endParaRPr lang="en-US"/>
           </a:p>
@@ -2904,7 +2909,7 @@
           <a:p>
             <a:fld id="{5CC0DD09-D29D-4A04-80A3-8DFC411E4748}" type="datetimeFigureOut">
               <a:rPr lang="en-US" smtClean="0"/>
-              <a:t>5/5/2023</a:t>
+              <a:t>5/23/2023</a:t>
             </a:fld>
             <a:endParaRPr lang="en-US"/>
           </a:p>

</xml_diff>